<commit_message>
added Module07 materials, Module08 slides, Module03 class notes
</commit_message>
<xml_diff>
--- a/Slides/Lesson 7.1 Solving Your Problem by Generalization.pptx
+++ b/Slides/Lesson 7.1 Solving Your Problem by Generalization.pptx
@@ -239,7 +239,7 @@
           <a:p>
             <a:fld id="{CA5085ED-56B4-45A6-801A-98AC77E76501}" type="datetimeFigureOut">
               <a:rPr lang="en-US" smtClean="0"/>
-              <a:t>9/26/2015</a:t>
+              <a:t>9/28/2015</a:t>
             </a:fld>
             <a:endParaRPr lang="en-US"/>
           </a:p>
@@ -857,7 +857,7 @@
           <a:p>
             <a:fld id="{2F1F79F5-7BEC-496A-AFC7-876E38F64D71}" type="datetime1">
               <a:rPr lang="en-US" smtClean="0"/>
-              <a:t>9/26/2015</a:t>
+              <a:t>9/28/2015</a:t>
             </a:fld>
             <a:endParaRPr lang="en-US"/>
           </a:p>
@@ -959,7 +959,7 @@
           <a:p>
             <a:fld id="{0A05703A-7669-4FEA-9056-25299B4D29D4}" type="datetime1">
               <a:rPr lang="en-US" smtClean="0"/>
-              <a:t>9/26/2015</a:t>
+              <a:t>9/28/2015</a:t>
             </a:fld>
             <a:endParaRPr lang="en-US"/>
           </a:p>
@@ -1236,7 +1236,7 @@
           <a:p>
             <a:fld id="{6E5077B5-BB57-49DB-88CA-226A139E5C01}" type="datetime1">
               <a:rPr lang="en-US" smtClean="0"/>
-              <a:t>9/26/2015</a:t>
+              <a:t>9/28/2015</a:t>
             </a:fld>
             <a:endParaRPr lang="en-US"/>
           </a:p>
@@ -1489,7 +1489,7 @@
           <a:p>
             <a:fld id="{C48D9447-CBD6-49A1-89FD-8512A8CF8999}" type="datetime1">
               <a:rPr lang="en-US" smtClean="0"/>
-              <a:t>9/26/2015</a:t>
+              <a:t>9/28/2015</a:t>
             </a:fld>
             <a:endParaRPr lang="en-US"/>
           </a:p>
@@ -1659,7 +1659,7 @@
           <a:p>
             <a:fld id="{A3639A2A-823D-48B7-9ACE-7FAF42870BA9}" type="datetime1">
               <a:rPr lang="en-US" smtClean="0"/>
-              <a:t>9/26/2015</a:t>
+              <a:t>9/28/2015</a:t>
             </a:fld>
             <a:endParaRPr lang="en-US"/>
           </a:p>
@@ -1839,7 +1839,7 @@
           <a:p>
             <a:fld id="{ED1B6996-82E9-463C-972C-7B56056E426C}" type="datetime1">
               <a:rPr lang="en-US" smtClean="0"/>
-              <a:t>9/26/2015</a:t>
+              <a:t>9/28/2015</a:t>
             </a:fld>
             <a:endParaRPr lang="en-US"/>
           </a:p>
@@ -2022,7 +2022,7 @@
           <a:p>
             <a:fld id="{E22ED4DA-448D-4BB1-B935-CC112220207B}" type="datetime1">
               <a:rPr lang="en-US" smtClean="0"/>
-              <a:t>9/26/2015</a:t>
+              <a:t>9/28/2015</a:t>
             </a:fld>
             <a:endParaRPr lang="en-US"/>
           </a:p>
@@ -2204,7 +2204,7 @@
           <a:p>
             <a:fld id="{E22ED4DA-448D-4BB1-B935-CC112220207B}" type="datetime1">
               <a:rPr lang="en-US" smtClean="0"/>
-              <a:t>9/26/2015</a:t>
+              <a:t>9/28/2015</a:t>
             </a:fld>
             <a:endParaRPr lang="en-US"/>
           </a:p>
@@ -2473,7 +2473,7 @@
           <a:p>
             <a:fld id="{FF5D65A6-AB94-4435-B0B7-3743215FA46C}" type="datetime1">
               <a:rPr lang="en-US" smtClean="0"/>
-              <a:t>9/26/2015</a:t>
+              <a:t>9/28/2015</a:t>
             </a:fld>
             <a:endParaRPr lang="en-US"/>
           </a:p>
@@ -2658,7 +2658,7 @@
           <a:p>
             <a:fld id="{FF5D65A6-AB94-4435-B0B7-3743215FA46C}" type="datetime1">
               <a:rPr lang="en-US" smtClean="0"/>
-              <a:t>9/26/2015</a:t>
+              <a:t>9/28/2015</a:t>
             </a:fld>
             <a:endParaRPr lang="en-US"/>
           </a:p>
@@ -2960,7 +2960,7 @@
           <a:p>
             <a:fld id="{7C193DC4-6EF0-48C9-B29C-616106A645E1}" type="datetime1">
               <a:rPr lang="en-US" smtClean="0"/>
-              <a:t>9/26/2015</a:t>
+              <a:t>9/28/2015</a:t>
             </a:fld>
             <a:endParaRPr lang="en-US"/>
           </a:p>
@@ -3248,7 +3248,7 @@
           <a:p>
             <a:fld id="{5D1846AD-9252-4647-9435-4C2AC365653A}" type="datetime1">
               <a:rPr lang="en-US" smtClean="0"/>
-              <a:t>9/26/2015</a:t>
+              <a:t>9/28/2015</a:t>
             </a:fld>
             <a:endParaRPr lang="en-US"/>
           </a:p>
@@ -3670,7 +3670,7 @@
           <a:p>
             <a:fld id="{CE56DC10-3561-4063-A6AF-C1CC7A41040A}" type="datetime1">
               <a:rPr lang="en-US" smtClean="0"/>
-              <a:t>9/26/2015</a:t>
+              <a:t>9/28/2015</a:t>
             </a:fld>
             <a:endParaRPr lang="en-US"/>
           </a:p>
@@ -3788,7 +3788,7 @@
           <a:p>
             <a:fld id="{2F7B77F5-1464-4F6B-92A8-64FC8A508293}" type="datetime1">
               <a:rPr lang="en-US" smtClean="0"/>
-              <a:t>9/26/2015</a:t>
+              <a:t>9/28/2015</a:t>
             </a:fld>
             <a:endParaRPr lang="en-US"/>
           </a:p>
@@ -4020,7 +4020,7 @@
           <a:p>
             <a:fld id="{02B3F677-983B-48DB-ADFD-63FE6CBC7FB2}" type="datetime1">
               <a:rPr lang="en-US" smtClean="0"/>
-              <a:t>9/26/2015</a:t>
+              <a:t>9/28/2015</a:t>
             </a:fld>
             <a:endParaRPr lang="en-US"/>
           </a:p>
@@ -5441,14 +5441,7 @@
                 <a:latin typeface="Consolas" pitchFamily="49" charset="0"/>
                 <a:cs typeface="Consolas" pitchFamily="49" charset="0"/>
               </a:rPr>
-              <a:t>-</a:t>
-            </a:r>
-            <a:r>
-              <a:rPr lang="en-US" sz="2000" b="1" dirty="0" smtClean="0">
-                <a:latin typeface="Consolas" pitchFamily="49" charset="0"/>
-                <a:cs typeface="Consolas" pitchFamily="49" charset="0"/>
-              </a:rPr>
-              <a:t>&gt; </a:t>
+              <a:t>-&gt; </a:t>
             </a:r>
             <a:r>
               <a:rPr lang="en-US" sz="2000" b="1" dirty="0" err="1" smtClean="0">
@@ -5666,11 +5659,7 @@
           <a:p>
             <a:r>
               <a:rPr lang="en-US" dirty="0" smtClean="0"/>
-              <a:t>Now </a:t>
-            </a:r>
-            <a:r>
-              <a:rPr lang="en-US" dirty="0" smtClean="0"/>
-              <a:t>the problem is easy</a:t>
+              <a:t>Now the problem is easy</a:t>
             </a:r>
             <a:endParaRPr lang="en-US" dirty="0"/>
           </a:p>
@@ -6063,10 +6052,6 @@
               </a:rPr>
               <a:t>;; STRATEGY: </a:t>
             </a:r>
-            <a:endParaRPr lang="en-US" b="1" dirty="0" smtClean="0">
-              <a:latin typeface="Consolas" pitchFamily="49" charset="0"/>
-              <a:cs typeface="Consolas" pitchFamily="49" charset="0"/>
-            </a:endParaRPr>
           </a:p>
           <a:p>
             <a:pPr marL="0" indent="0">
@@ -6080,28 +6065,7 @@
                 <a:latin typeface="Consolas" pitchFamily="49" charset="0"/>
                 <a:cs typeface="Consolas" pitchFamily="49" charset="0"/>
               </a:rPr>
-              <a:t>;; </a:t>
-            </a:r>
-            <a:r>
-              <a:rPr lang="en-US" b="1" dirty="0" smtClean="0">
-                <a:latin typeface="Consolas" pitchFamily="49" charset="0"/>
-                <a:cs typeface="Consolas" pitchFamily="49" charset="0"/>
-              </a:rPr>
-              <a:t>Call </a:t>
-            </a:r>
-            <a:r>
-              <a:rPr lang="en-US" b="1" dirty="0" smtClean="0">
-                <a:latin typeface="Consolas" pitchFamily="49" charset="0"/>
-                <a:cs typeface="Consolas" pitchFamily="49" charset="0"/>
-              </a:rPr>
-              <a:t>a </a:t>
-            </a:r>
-            <a:r>
-              <a:rPr lang="en-US" b="1" dirty="0" smtClean="0">
-                <a:latin typeface="Consolas" pitchFamily="49" charset="0"/>
-                <a:cs typeface="Consolas" pitchFamily="49" charset="0"/>
-              </a:rPr>
-              <a:t>more general function</a:t>
+              <a:t>;; Call a more general function</a:t>
             </a:r>
           </a:p>
           <a:p>
@@ -6291,11 +6255,7 @@
             </a:r>
             <a:r>
               <a:rPr lang="en-US" dirty="0" smtClean="0"/>
-              <a:t> again, in a different </a:t>
-            </a:r>
-            <a:r>
-              <a:rPr lang="en-US" dirty="0" smtClean="0"/>
-              <a:t>way that may give us some more insight.</a:t>
+              <a:t> again, in a different way that may give us some more insight.</a:t>
             </a:r>
             <a:endParaRPr lang="en-US" dirty="0"/>
           </a:p>
@@ -7678,15 +7638,7 @@
           <a:p>
             <a:r>
               <a:rPr lang="en-US" dirty="0" smtClean="0"/>
-              <a:t>The </a:t>
-            </a:r>
-            <a:r>
-              <a:rPr lang="en-US" dirty="0" smtClean="0"/>
-              <a:t>function has </a:t>
-            </a:r>
-            <a:r>
-              <a:rPr lang="en-US" dirty="0" smtClean="0"/>
-              <a:t>lost track of the original list; it only knows its position in the original.</a:t>
+              <a:t>The function has lost track of the original list; it only knows its position in the original.</a:t>
             </a:r>
           </a:p>
           <a:p>
@@ -7825,16 +7777,11 @@
               <a:rPr lang="en-US" dirty="0" smtClean="0"/>
               <a:t>by simply using a template.</a:t>
             </a:r>
-            <a:endParaRPr lang="en-US" dirty="0" smtClean="0"/>
           </a:p>
           <a:p>
             <a:r>
               <a:rPr lang="en-US" dirty="0" smtClean="0"/>
-              <a:t>We </a:t>
-            </a:r>
-            <a:r>
-              <a:rPr lang="en-US" dirty="0" smtClean="0"/>
-              <a:t>show how to solve such many such problems by introducing new variables called </a:t>
+              <a:t>We show how to solve such many such problems by introducing new variables called </a:t>
             </a:r>
             <a:r>
               <a:rPr lang="en-US" i="1" dirty="0" smtClean="0">
@@ -7848,7 +7795,6 @@
               <a:rPr lang="en-US" dirty="0" smtClean="0"/>
               <a:t>.</a:t>
             </a:r>
-            <a:endParaRPr lang="en-US" dirty="0" smtClean="0"/>
           </a:p>
           <a:p>
             <a:r>
@@ -7873,13 +7819,8 @@
             </a:r>
             <a:r>
               <a:rPr lang="en-US" dirty="0" smtClean="0"/>
-              <a:t>as a way of recording the assumptions that a function makes about its </a:t>
-            </a:r>
-            <a:r>
-              <a:rPr lang="en-US" dirty="0" smtClean="0"/>
-              <a:t>context.</a:t>
-            </a:r>
-            <a:endParaRPr lang="en-US" dirty="0" smtClean="0"/>
+              <a:t>as a way of recording the assumptions that a function makes about its context.</a:t>
+            </a:r>
           </a:p>
           <a:p>
             <a:endParaRPr lang="en-US" dirty="0"/>
@@ -8240,47 +8181,36 @@
                 <a:latin typeface="Consolas" pitchFamily="49" charset="0"/>
                 <a:cs typeface="Consolas" pitchFamily="49" charset="0"/>
               </a:rPr>
-              <a:t>;; strategy: </a:t>
+              <a:t>;; strategy: Use template for </a:t>
+            </a:r>
+            <a:r>
+              <a:rPr lang="en-US" sz="2000" b="1" dirty="0" err="1" smtClean="0">
+                <a:latin typeface="Consolas" pitchFamily="49" charset="0"/>
+                <a:cs typeface="Consolas" pitchFamily="49" charset="0"/>
+              </a:rPr>
+              <a:t>ListOfX</a:t>
             </a:r>
             <a:r>
               <a:rPr lang="en-US" sz="2000" b="1" dirty="0" smtClean="0">
                 <a:latin typeface="Consolas" pitchFamily="49" charset="0"/>
                 <a:cs typeface="Consolas" pitchFamily="49" charset="0"/>
               </a:rPr>
-              <a:t>Use template for </a:t>
+              <a:t> on </a:t>
             </a:r>
             <a:r>
               <a:rPr lang="en-US" sz="2000" b="1" dirty="0" err="1" smtClean="0">
                 <a:latin typeface="Consolas" pitchFamily="49" charset="0"/>
                 <a:cs typeface="Consolas" pitchFamily="49" charset="0"/>
               </a:rPr>
-              <a:t>ListOfX</a:t>
+              <a:t>slst</a:t>
             </a:r>
             <a:r>
               <a:rPr lang="en-US" sz="2000" b="1" dirty="0" smtClean="0">
                 <a:latin typeface="Consolas" pitchFamily="49" charset="0"/>
                 <a:cs typeface="Consolas" pitchFamily="49" charset="0"/>
               </a:rPr>
-              <a:t> on </a:t>
-            </a:r>
-            <a:r>
-              <a:rPr lang="en-US" sz="2000" b="1" dirty="0" err="1" smtClean="0">
-                <a:latin typeface="Consolas" pitchFamily="49" charset="0"/>
-                <a:cs typeface="Consolas" pitchFamily="49" charset="0"/>
-              </a:rPr>
-              <a:t>slst</a:t>
-            </a:r>
-            <a:r>
-              <a:rPr lang="en-US" sz="2000" b="1" dirty="0" smtClean="0">
-                <a:latin typeface="Consolas" pitchFamily="49" charset="0"/>
-                <a:cs typeface="Consolas" pitchFamily="49" charset="0"/>
-              </a:rPr>
               <a:t> </a:t>
             </a:r>
-            <a:endParaRPr lang="en-US" sz="2000" b="1" dirty="0" smtClean="0">
-              <a:latin typeface="Consolas" pitchFamily="49" charset="0"/>
-              <a:cs typeface="Consolas" pitchFamily="49" charset="0"/>
-            </a:endParaRPr>
           </a:p>
           <a:p>
             <a:pPr>
@@ -9291,11 +9221,6 @@
               </a:rPr>
               <a:t> of the original, </a:t>
             </a:r>
-            <a:endParaRPr lang="en-US" dirty="0" smtClean="0">
-              <a:solidFill>
-                <a:schemeClr val="tx1"/>
-              </a:solidFill>
-            </a:endParaRPr>
           </a:p>
           <a:p>
             <a:r>
@@ -9314,7 +9239,15 @@
                   <a:schemeClr val="tx1"/>
                 </a:solidFill>
               </a:rPr>
-              <a:t>  (</a:t>
+              <a:t>  (rest </a:t>
+            </a:r>
+            <a:r>
+              <a:rPr lang="en-US" b="1" dirty="0" err="1" smtClean="0">
+                <a:solidFill>
+                  <a:schemeClr val="tx1"/>
+                </a:solidFill>
+              </a:rPr>
+              <a:t>lst</a:t>
             </a:r>
             <a:r>
               <a:rPr lang="en-US" b="1" dirty="0" smtClean="0">
@@ -9322,15 +9255,15 @@
                   <a:schemeClr val="tx1"/>
                 </a:solidFill>
               </a:rPr>
-              <a:t>rest </a:t>
-            </a:r>
-            <a:r>
-              <a:rPr lang="en-US" b="1" dirty="0" err="1" smtClean="0">
+              <a:t>) </a:t>
+            </a:r>
+            <a:r>
+              <a:rPr lang="en-US" dirty="0" smtClean="0">
                 <a:solidFill>
                   <a:schemeClr val="tx1"/>
                 </a:solidFill>
               </a:rPr>
-              <a:t>lst</a:t>
+              <a:t>is its </a:t>
             </a:r>
             <a:r>
               <a:rPr lang="en-US" b="1" dirty="0" smtClean="0">
@@ -9338,7 +9271,7 @@
                   <a:schemeClr val="tx1"/>
                 </a:solidFill>
               </a:rPr>
-              <a:t>) </a:t>
+              <a:t>(n+1)</a:t>
             </a:r>
             <a:r>
               <a:rPr lang="en-US" dirty="0" smtClean="0">
@@ -9346,15 +9279,15 @@
                   <a:schemeClr val="tx1"/>
                 </a:solidFill>
               </a:rPr>
-              <a:t>is its </a:t>
-            </a:r>
-            <a:r>
-              <a:rPr lang="en-US" b="1" dirty="0" smtClean="0">
+              <a:t>-</a:t>
+            </a:r>
+            <a:r>
+              <a:rPr lang="en-US" dirty="0" err="1" smtClean="0">
                 <a:solidFill>
                   <a:schemeClr val="tx1"/>
                 </a:solidFill>
               </a:rPr>
-              <a:t>(n+1)</a:t>
+              <a:t>st</a:t>
             </a:r>
             <a:r>
               <a:rPr lang="en-US" dirty="0" smtClean="0">
@@ -9362,7 +9295,7 @@
                   <a:schemeClr val="tx1"/>
                 </a:solidFill>
               </a:rPr>
-              <a:t>-</a:t>
+              <a:t> </a:t>
             </a:r>
             <a:r>
               <a:rPr lang="en-US" dirty="0" err="1" smtClean="0">
@@ -9370,7 +9303,7 @@
                   <a:schemeClr val="tx1"/>
                 </a:solidFill>
               </a:rPr>
-              <a:t>st</a:t>
+              <a:t>sublist</a:t>
             </a:r>
             <a:r>
               <a:rPr lang="en-US" dirty="0" smtClean="0">
@@ -9378,31 +9311,7 @@
                   <a:schemeClr val="tx1"/>
                 </a:solidFill>
               </a:rPr>
-              <a:t> </a:t>
-            </a:r>
-            <a:r>
-              <a:rPr lang="en-US" dirty="0" err="1" smtClean="0">
-                <a:solidFill>
-                  <a:schemeClr val="tx1"/>
-                </a:solidFill>
-              </a:rPr>
-              <a:t>sublist</a:t>
-            </a:r>
-            <a:r>
-              <a:rPr lang="en-US" dirty="0" smtClean="0">
-                <a:solidFill>
-                  <a:schemeClr val="tx1"/>
-                </a:solidFill>
-              </a:rPr>
-              <a:t>.  </a:t>
-            </a:r>
-            <a:r>
-              <a:rPr lang="en-US" dirty="0" smtClean="0">
-                <a:solidFill>
-                  <a:schemeClr val="tx1"/>
-                </a:solidFill>
-              </a:rPr>
-              <a:t> </a:t>
+              <a:t>.   </a:t>
             </a:r>
             <a:endParaRPr lang="en-US" dirty="0">
               <a:solidFill>
@@ -9463,15 +9372,7 @@
                   <a:schemeClr val="tx1"/>
                 </a:solidFill>
               </a:rPr>
-              <a:t>So, if </a:t>
-            </a:r>
-            <a:r>
-              <a:rPr lang="en-US" dirty="0" smtClean="0">
-                <a:solidFill>
-                  <a:schemeClr val="tx1"/>
-                </a:solidFill>
-              </a:rPr>
-              <a:t>the current call satisfies the invariant, then the recursive call also satisfies the invariant.</a:t>
+              <a:t>So, if the current call satisfies the invariant, then the recursive call also satisfies the invariant.</a:t>
             </a:r>
             <a:endParaRPr lang="en-US" dirty="0">
               <a:solidFill>
@@ -9829,11 +9730,7 @@
           <a:p>
             <a:r>
               <a:rPr lang="en-US" sz="2800" dirty="0" smtClean="0"/>
-              <a:t>-- </a:t>
-            </a:r>
-            <a:r>
-              <a:rPr lang="en-US" sz="2800" dirty="0" smtClean="0"/>
-              <a:t>A Ring is a (make-ring Real Real)</a:t>
+              <a:t>-- A Ring is a (make-ring Real Real)</a:t>
             </a:r>
           </a:p>
           <a:p>
@@ -14429,74 +14326,88 @@
               <a:buNone/>
             </a:pPr>
             <a:r>
+              <a:rPr lang="en-US" sz="2400" b="1" dirty="0">
+                <a:latin typeface="Consolas" pitchFamily="49" charset="0"/>
+                <a:cs typeface="Consolas" pitchFamily="49" charset="0"/>
+              </a:rPr>
+              <a:t>A </a:t>
+            </a:r>
+            <a:r>
+              <a:rPr lang="en-US" sz="2400" b="1" dirty="0" err="1">
+                <a:latin typeface="Consolas" pitchFamily="49" charset="0"/>
+                <a:cs typeface="Consolas" pitchFamily="49" charset="0"/>
+              </a:rPr>
+              <a:t>NumberedX</a:t>
+            </a:r>
+            <a:r>
+              <a:rPr lang="en-US" sz="2400" b="1" dirty="0">
+                <a:latin typeface="Consolas" pitchFamily="49" charset="0"/>
+                <a:cs typeface="Consolas" pitchFamily="49" charset="0"/>
+              </a:rPr>
+              <a:t> </a:t>
+            </a:r>
+            <a:r>
               <a:rPr lang="en-US" sz="2400" b="1" dirty="0" smtClean="0">
                 <a:latin typeface="Consolas" pitchFamily="49" charset="0"/>
                 <a:cs typeface="Consolas" pitchFamily="49" charset="0"/>
               </a:rPr>
+              <a:t>      is </a:t>
+            </a:r>
+            <a:r>
+              <a:rPr lang="en-US" sz="2400" b="1" dirty="0">
+                <a:latin typeface="Consolas" pitchFamily="49" charset="0"/>
+                <a:cs typeface="Consolas" pitchFamily="49" charset="0"/>
+              </a:rPr>
+              <a:t>a (list </a:t>
+            </a:r>
+            <a:r>
+              <a:rPr lang="en-US" sz="2400" b="1" dirty="0" err="1">
+                <a:latin typeface="Consolas" pitchFamily="49" charset="0"/>
+                <a:cs typeface="Consolas" pitchFamily="49" charset="0"/>
+              </a:rPr>
+              <a:t>Int</a:t>
+            </a:r>
+            <a:r>
+              <a:rPr lang="en-US" sz="2400" b="1" dirty="0">
+                <a:latin typeface="Consolas" pitchFamily="49" charset="0"/>
+                <a:cs typeface="Consolas" pitchFamily="49" charset="0"/>
+              </a:rPr>
+              <a:t> X)</a:t>
+            </a:r>
+          </a:p>
+          <a:p>
+            <a:pPr>
+              <a:buNone/>
+            </a:pPr>
+            <a:r>
+              <a:rPr lang="en-US" sz="2400" b="1" dirty="0">
+                <a:latin typeface="Consolas" pitchFamily="49" charset="0"/>
+                <a:cs typeface="Consolas" pitchFamily="49" charset="0"/>
+              </a:rPr>
               <a:t>A </a:t>
             </a:r>
             <a:r>
+              <a:rPr lang="en-US" sz="2400" b="1" dirty="0" err="1">
+                <a:latin typeface="Consolas" pitchFamily="49" charset="0"/>
+                <a:cs typeface="Consolas" pitchFamily="49" charset="0"/>
+              </a:rPr>
+              <a:t>NumberedListOfX</a:t>
+            </a:r>
+            <a:r>
+              <a:rPr lang="en-US" sz="2400" b="1" dirty="0">
+                <a:latin typeface="Consolas" pitchFamily="49" charset="0"/>
+                <a:cs typeface="Consolas" pitchFamily="49" charset="0"/>
+              </a:rPr>
+              <a:t> is a </a:t>
+            </a:r>
+            <a:r>
               <a:rPr lang="en-US" sz="2400" b="1" dirty="0" err="1" smtClean="0">
                 <a:latin typeface="Consolas" pitchFamily="49" charset="0"/>
                 <a:cs typeface="Consolas" pitchFamily="49" charset="0"/>
               </a:rPr>
-              <a:t>NumberedX</a:t>
-            </a:r>
-            <a:r>
-              <a:rPr lang="en-US" sz="2400" b="1" dirty="0" smtClean="0">
-                <a:latin typeface="Consolas" pitchFamily="49" charset="0"/>
-                <a:cs typeface="Consolas" pitchFamily="49" charset="0"/>
-              </a:rPr>
-              <a:t> is a (list </a:t>
-            </a:r>
-            <a:r>
-              <a:rPr lang="en-US" sz="2400" b="1" dirty="0" err="1" smtClean="0">
-                <a:latin typeface="Consolas" pitchFamily="49" charset="0"/>
-                <a:cs typeface="Consolas" pitchFamily="49" charset="0"/>
-              </a:rPr>
-              <a:t>Int</a:t>
-            </a:r>
-            <a:r>
-              <a:rPr lang="en-US" sz="2400" b="1" dirty="0" smtClean="0">
-                <a:latin typeface="Consolas" pitchFamily="49" charset="0"/>
-                <a:cs typeface="Consolas" pitchFamily="49" charset="0"/>
-              </a:rPr>
-              <a:t> X)</a:t>
-            </a:r>
-          </a:p>
-          <a:p>
-            <a:pPr>
-              <a:buNone/>
-            </a:pPr>
-            <a:r>
-              <a:rPr lang="en-US" sz="2400" b="1" dirty="0" smtClean="0">
-                <a:latin typeface="Consolas" pitchFamily="49" charset="0"/>
-                <a:cs typeface="Consolas" pitchFamily="49" charset="0"/>
-              </a:rPr>
-              <a:t>A </a:t>
-            </a:r>
-            <a:r>
-              <a:rPr lang="en-US" sz="2400" b="1" dirty="0" err="1" smtClean="0">
-                <a:latin typeface="Consolas" pitchFamily="49" charset="0"/>
-                <a:cs typeface="Consolas" pitchFamily="49" charset="0"/>
-              </a:rPr>
-              <a:t>NumberedListOfX</a:t>
-            </a:r>
-            <a:r>
-              <a:rPr lang="en-US" sz="2400" b="1" dirty="0" smtClean="0">
-                <a:latin typeface="Consolas" pitchFamily="49" charset="0"/>
-                <a:cs typeface="Consolas" pitchFamily="49" charset="0"/>
-              </a:rPr>
-              <a:t> is a </a:t>
-            </a:r>
-            <a:r>
-              <a:rPr lang="en-US" sz="2400" b="1" dirty="0" err="1" smtClean="0">
-                <a:latin typeface="Consolas" pitchFamily="49" charset="0"/>
-                <a:cs typeface="Consolas" pitchFamily="49" charset="0"/>
-              </a:rPr>
               <a:t>ListOfNumberedX</a:t>
             </a:r>
-            <a:endParaRPr lang="en-US" sz="2400" b="1" dirty="0" smtClean="0">
+            <a:endParaRPr lang="en-US" sz="2400" b="1" dirty="0">
               <a:latin typeface="Consolas" pitchFamily="49" charset="0"/>
               <a:cs typeface="Consolas" pitchFamily="49" charset="0"/>
             </a:endParaRPr>

</xml_diff>

<commit_message>
Jim's edits for Lessons 7.1-7.6
</commit_message>
<xml_diff>
--- a/Slides/Lesson 7.1 Solving Your Problem by Generalization.pptx
+++ b/Slides/Lesson 7.1 Solving Your Problem by Generalization.pptx
@@ -239,7 +239,7 @@
           <a:p>
             <a:fld id="{CA5085ED-56B4-45A6-801A-98AC77E76501}" type="datetimeFigureOut">
               <a:rPr lang="en-US" smtClean="0"/>
-              <a:t>9/28/2015</a:t>
+              <a:t>10/25/2015</a:t>
             </a:fld>
             <a:endParaRPr lang="en-US"/>
           </a:p>
@@ -857,7 +857,7 @@
           <a:p>
             <a:fld id="{2F1F79F5-7BEC-496A-AFC7-876E38F64D71}" type="datetime1">
               <a:rPr lang="en-US" smtClean="0"/>
-              <a:t>9/28/2015</a:t>
+              <a:t>10/25/2015</a:t>
             </a:fld>
             <a:endParaRPr lang="en-US"/>
           </a:p>
@@ -959,7 +959,7 @@
           <a:p>
             <a:fld id="{0A05703A-7669-4FEA-9056-25299B4D29D4}" type="datetime1">
               <a:rPr lang="en-US" smtClean="0"/>
-              <a:t>9/28/2015</a:t>
+              <a:t>10/25/2015</a:t>
             </a:fld>
             <a:endParaRPr lang="en-US"/>
           </a:p>
@@ -1236,7 +1236,7 @@
           <a:p>
             <a:fld id="{6E5077B5-BB57-49DB-88CA-226A139E5C01}" type="datetime1">
               <a:rPr lang="en-US" smtClean="0"/>
-              <a:t>9/28/2015</a:t>
+              <a:t>10/25/2015</a:t>
             </a:fld>
             <a:endParaRPr lang="en-US"/>
           </a:p>
@@ -1489,7 +1489,7 @@
           <a:p>
             <a:fld id="{C48D9447-CBD6-49A1-89FD-8512A8CF8999}" type="datetime1">
               <a:rPr lang="en-US" smtClean="0"/>
-              <a:t>9/28/2015</a:t>
+              <a:t>10/25/2015</a:t>
             </a:fld>
             <a:endParaRPr lang="en-US"/>
           </a:p>
@@ -1659,7 +1659,7 @@
           <a:p>
             <a:fld id="{A3639A2A-823D-48B7-9ACE-7FAF42870BA9}" type="datetime1">
               <a:rPr lang="en-US" smtClean="0"/>
-              <a:t>9/28/2015</a:t>
+              <a:t>10/25/2015</a:t>
             </a:fld>
             <a:endParaRPr lang="en-US"/>
           </a:p>
@@ -1839,7 +1839,7 @@
           <a:p>
             <a:fld id="{ED1B6996-82E9-463C-972C-7B56056E426C}" type="datetime1">
               <a:rPr lang="en-US" smtClean="0"/>
-              <a:t>9/28/2015</a:t>
+              <a:t>10/25/2015</a:t>
             </a:fld>
             <a:endParaRPr lang="en-US"/>
           </a:p>
@@ -2022,7 +2022,7 @@
           <a:p>
             <a:fld id="{E22ED4DA-448D-4BB1-B935-CC112220207B}" type="datetime1">
               <a:rPr lang="en-US" smtClean="0"/>
-              <a:t>9/28/2015</a:t>
+              <a:t>10/25/2015</a:t>
             </a:fld>
             <a:endParaRPr lang="en-US"/>
           </a:p>
@@ -2204,7 +2204,7 @@
           <a:p>
             <a:fld id="{E22ED4DA-448D-4BB1-B935-CC112220207B}" type="datetime1">
               <a:rPr lang="en-US" smtClean="0"/>
-              <a:t>9/28/2015</a:t>
+              <a:t>10/25/2015</a:t>
             </a:fld>
             <a:endParaRPr lang="en-US"/>
           </a:p>
@@ -2473,7 +2473,7 @@
           <a:p>
             <a:fld id="{FF5D65A6-AB94-4435-B0B7-3743215FA46C}" type="datetime1">
               <a:rPr lang="en-US" smtClean="0"/>
-              <a:t>9/28/2015</a:t>
+              <a:t>10/25/2015</a:t>
             </a:fld>
             <a:endParaRPr lang="en-US"/>
           </a:p>
@@ -2658,7 +2658,7 @@
           <a:p>
             <a:fld id="{FF5D65A6-AB94-4435-B0B7-3743215FA46C}" type="datetime1">
               <a:rPr lang="en-US" smtClean="0"/>
-              <a:t>9/28/2015</a:t>
+              <a:t>10/25/2015</a:t>
             </a:fld>
             <a:endParaRPr lang="en-US"/>
           </a:p>
@@ -2960,7 +2960,7 @@
           <a:p>
             <a:fld id="{7C193DC4-6EF0-48C9-B29C-616106A645E1}" type="datetime1">
               <a:rPr lang="en-US" smtClean="0"/>
-              <a:t>9/28/2015</a:t>
+              <a:t>10/25/2015</a:t>
             </a:fld>
             <a:endParaRPr lang="en-US"/>
           </a:p>
@@ -3248,7 +3248,7 @@
           <a:p>
             <a:fld id="{5D1846AD-9252-4647-9435-4C2AC365653A}" type="datetime1">
               <a:rPr lang="en-US" smtClean="0"/>
-              <a:t>9/28/2015</a:t>
+              <a:t>10/25/2015</a:t>
             </a:fld>
             <a:endParaRPr lang="en-US"/>
           </a:p>
@@ -3670,7 +3670,7 @@
           <a:p>
             <a:fld id="{CE56DC10-3561-4063-A6AF-C1CC7A41040A}" type="datetime1">
               <a:rPr lang="en-US" smtClean="0"/>
-              <a:t>9/28/2015</a:t>
+              <a:t>10/25/2015</a:t>
             </a:fld>
             <a:endParaRPr lang="en-US"/>
           </a:p>
@@ -3788,7 +3788,7 @@
           <a:p>
             <a:fld id="{2F7B77F5-1464-4F6B-92A8-64FC8A508293}" type="datetime1">
               <a:rPr lang="en-US" smtClean="0"/>
-              <a:t>9/28/2015</a:t>
+              <a:t>10/25/2015</a:t>
             </a:fld>
             <a:endParaRPr lang="en-US"/>
           </a:p>
@@ -4020,7 +4020,7 @@
           <a:p>
             <a:fld id="{02B3F677-983B-48DB-ADFD-63FE6CBC7FB2}" type="datetime1">
               <a:rPr lang="en-US" smtClean="0"/>
-              <a:t>9/28/2015</a:t>
+              <a:t>10/25/2015</a:t>
             </a:fld>
             <a:endParaRPr lang="en-US"/>
           </a:p>
@@ -7781,7 +7781,15 @@
           <a:p>
             <a:r>
               <a:rPr lang="en-US" dirty="0" smtClean="0"/>
-              <a:t>We show how to solve such many such problems by introducing new variables called </a:t>
+              <a:t>We show how to solve </a:t>
+            </a:r>
+            <a:r>
+              <a:rPr lang="en-US" dirty="0" smtClean="0"/>
+              <a:t>many </a:t>
+            </a:r>
+            <a:r>
+              <a:rPr lang="en-US" dirty="0" smtClean="0"/>
+              <a:t>such problems by introducing new variables called </a:t>
             </a:r>
             <a:r>
               <a:rPr lang="en-US" i="1" dirty="0" smtClean="0">
@@ -10280,7 +10288,11 @@
             <a:graphicFrameLocks/>
           </p:cNvGraphicFramePr>
           <p:nvPr>
-            <p:extLst/>
+            <p:extLst>
+              <p:ext uri="{D42A27DB-BD31-4B8C-83A1-F6EECF244321}">
+                <p14:modId xmlns:p14="http://schemas.microsoft.com/office/powerpoint/2010/main" val="3462369161"/>
+              </p:ext>
+            </p:extLst>
           </p:nvPr>
         </p:nvGraphicFramePr>
         <p:xfrm>
@@ -10345,7 +10357,23 @@
                             <a:schemeClr val="tx1"/>
                           </a:solidFill>
                         </a:rPr>
-                        <a:t>Formulate a generalized version of the problem that</a:t>
+                        <a:t>Formulate a generalized version of the </a:t>
+                      </a:r>
+                      <a:r>
+                        <a:rPr lang="en-US" smtClean="0">
+                          <a:solidFill>
+                            <a:schemeClr val="tx1"/>
+                          </a:solidFill>
+                        </a:rPr>
+                        <a:t>problem </a:t>
+                      </a:r>
+                      <a:r>
+                        <a:rPr lang="en-US" baseline="0" smtClean="0">
+                          <a:solidFill>
+                            <a:schemeClr val="tx1"/>
+                          </a:solidFill>
+                        </a:rPr>
+                        <a:t>that </a:t>
                       </a:r>
                       <a:r>
                         <a:rPr lang="en-US" baseline="0" dirty="0" smtClean="0">
@@ -10353,7 +10381,7 @@
                             <a:schemeClr val="tx1"/>
                           </a:solidFill>
                         </a:rPr>
-                        <a:t> that works on a substructure of your original. Add a context argument that represents the information "above" the substructure.  Document the purpose of the context argument as an invariant in your purpose statement.</a:t>
+                        <a:t>works on a substructure of your original. Add a context argument that represents the information "above" the substructure.  Document the purpose of the context argument as an invariant in your purpose statement.</a:t>
                       </a:r>
                       <a:endParaRPr lang="en-US" dirty="0">
                         <a:solidFill>
@@ -14594,7 +14622,7 @@
                 <a:latin typeface="Consolas" pitchFamily="49" charset="0"/>
                 <a:cs typeface="Consolas" pitchFamily="49" charset="0"/>
               </a:rPr>
-              <a:t>NumberedListofX</a:t>
+              <a:t>NumberedListofString</a:t>
             </a:r>
             <a:endParaRPr lang="en-US" sz="2400" b="1" dirty="0" smtClean="0">
               <a:latin typeface="Consolas" pitchFamily="49" charset="0"/>

</xml_diff>